<commit_message>
new before submit changes
</commit_message>
<xml_diff>
--- a/documentation/Job portal documentation.pptx
+++ b/documentation/Job portal documentation.pptx
@@ -428,7 +428,7 @@
           <a:p>
             <a:fld id="{91912CC2-A05A-4F65-AF8C-0020DE008670}" type="datetimeFigureOut">
               <a:rPr lang="en-IN" smtClean="0"/>
-              <a:t>04-05-2025</a:t>
+              <a:t>22-06-2025</a:t>
             </a:fld>
             <a:endParaRPr lang="en-IN"/>
           </a:p>
@@ -715,7 +715,7 @@
           <a:p>
             <a:fld id="{91912CC2-A05A-4F65-AF8C-0020DE008670}" type="datetimeFigureOut">
               <a:rPr lang="en-IN" smtClean="0"/>
-              <a:t>04-05-2025</a:t>
+              <a:t>22-06-2025</a:t>
             </a:fld>
             <a:endParaRPr lang="en-IN"/>
           </a:p>
@@ -907,7 +907,7 @@
           <a:p>
             <a:fld id="{91912CC2-A05A-4F65-AF8C-0020DE008670}" type="datetimeFigureOut">
               <a:rPr lang="en-IN" smtClean="0"/>
-              <a:t>04-05-2025</a:t>
+              <a:t>22-06-2025</a:t>
             </a:fld>
             <a:endParaRPr lang="en-IN"/>
           </a:p>
@@ -1168,7 +1168,7 @@
           <a:p>
             <a:fld id="{91912CC2-A05A-4F65-AF8C-0020DE008670}" type="datetimeFigureOut">
               <a:rPr lang="en-IN" smtClean="0"/>
-              <a:t>04-05-2025</a:t>
+              <a:t>22-06-2025</a:t>
             </a:fld>
             <a:endParaRPr lang="en-IN"/>
           </a:p>
@@ -1592,7 +1592,7 @@
           <a:p>
             <a:fld id="{91912CC2-A05A-4F65-AF8C-0020DE008670}" type="datetimeFigureOut">
               <a:rPr lang="en-IN" smtClean="0"/>
-              <a:t>04-05-2025</a:t>
+              <a:t>22-06-2025</a:t>
             </a:fld>
             <a:endParaRPr lang="en-IN"/>
           </a:p>
@@ -2138,7 +2138,7 @@
           <a:p>
             <a:fld id="{91912CC2-A05A-4F65-AF8C-0020DE008670}" type="datetimeFigureOut">
               <a:rPr lang="en-IN" smtClean="0"/>
-              <a:t>04-05-2025</a:t>
+              <a:t>22-06-2025</a:t>
             </a:fld>
             <a:endParaRPr lang="en-IN"/>
           </a:p>
@@ -2978,7 +2978,7 @@
           <a:p>
             <a:fld id="{91912CC2-A05A-4F65-AF8C-0020DE008670}" type="datetimeFigureOut">
               <a:rPr lang="en-IN" smtClean="0"/>
-              <a:t>04-05-2025</a:t>
+              <a:t>22-06-2025</a:t>
             </a:fld>
             <a:endParaRPr lang="en-IN"/>
           </a:p>
@@ -3148,7 +3148,7 @@
           <a:p>
             <a:fld id="{91912CC2-A05A-4F65-AF8C-0020DE008670}" type="datetimeFigureOut">
               <a:rPr lang="en-IN" smtClean="0"/>
-              <a:t>04-05-2025</a:t>
+              <a:t>22-06-2025</a:t>
             </a:fld>
             <a:endParaRPr lang="en-IN"/>
           </a:p>
@@ -3332,7 +3332,7 @@
           <a:p>
             <a:fld id="{91912CC2-A05A-4F65-AF8C-0020DE008670}" type="datetimeFigureOut">
               <a:rPr lang="en-IN" smtClean="0"/>
-              <a:t>04-05-2025</a:t>
+              <a:t>22-06-2025</a:t>
             </a:fld>
             <a:endParaRPr lang="en-IN"/>
           </a:p>
@@ -3502,7 +3502,7 @@
           <a:p>
             <a:fld id="{91912CC2-A05A-4F65-AF8C-0020DE008670}" type="datetimeFigureOut">
               <a:rPr lang="en-IN" smtClean="0"/>
-              <a:t>04-05-2025</a:t>
+              <a:t>22-06-2025</a:t>
             </a:fld>
             <a:endParaRPr lang="en-IN"/>
           </a:p>
@@ -3750,7 +3750,7 @@
           <a:p>
             <a:fld id="{91912CC2-A05A-4F65-AF8C-0020DE008670}" type="datetimeFigureOut">
               <a:rPr lang="en-IN" smtClean="0"/>
-              <a:t>04-05-2025</a:t>
+              <a:t>22-06-2025</a:t>
             </a:fld>
             <a:endParaRPr lang="en-IN"/>
           </a:p>
@@ -3987,7 +3987,7 @@
           <a:p>
             <a:fld id="{91912CC2-A05A-4F65-AF8C-0020DE008670}" type="datetimeFigureOut">
               <a:rPr lang="en-IN" smtClean="0"/>
-              <a:t>04-05-2025</a:t>
+              <a:t>22-06-2025</a:t>
             </a:fld>
             <a:endParaRPr lang="en-IN"/>
           </a:p>
@@ -4360,7 +4360,7 @@
           <a:p>
             <a:fld id="{91912CC2-A05A-4F65-AF8C-0020DE008670}" type="datetimeFigureOut">
               <a:rPr lang="en-IN" smtClean="0"/>
-              <a:t>04-05-2025</a:t>
+              <a:t>22-06-2025</a:t>
             </a:fld>
             <a:endParaRPr lang="en-IN"/>
           </a:p>
@@ -4478,7 +4478,7 @@
           <a:p>
             <a:fld id="{91912CC2-A05A-4F65-AF8C-0020DE008670}" type="datetimeFigureOut">
               <a:rPr lang="en-IN" smtClean="0"/>
-              <a:t>04-05-2025</a:t>
+              <a:t>22-06-2025</a:t>
             </a:fld>
             <a:endParaRPr lang="en-IN"/>
           </a:p>
@@ -4573,7 +4573,7 @@
           <a:p>
             <a:fld id="{91912CC2-A05A-4F65-AF8C-0020DE008670}" type="datetimeFigureOut">
               <a:rPr lang="en-IN" smtClean="0"/>
-              <a:t>04-05-2025</a:t>
+              <a:t>22-06-2025</a:t>
             </a:fld>
             <a:endParaRPr lang="en-IN"/>
           </a:p>
@@ -4824,7 +4824,7 @@
           <a:p>
             <a:fld id="{91912CC2-A05A-4F65-AF8C-0020DE008670}" type="datetimeFigureOut">
               <a:rPr lang="en-IN" smtClean="0"/>
-              <a:t>04-05-2025</a:t>
+              <a:t>22-06-2025</a:t>
             </a:fld>
             <a:endParaRPr lang="en-IN"/>
           </a:p>
@@ -5111,7 +5111,7 @@
           <a:p>
             <a:fld id="{91912CC2-A05A-4F65-AF8C-0020DE008670}" type="datetimeFigureOut">
               <a:rPr lang="en-IN" smtClean="0"/>
-              <a:t>04-05-2025</a:t>
+              <a:t>22-06-2025</a:t>
             </a:fld>
             <a:endParaRPr lang="en-IN"/>
           </a:p>
@@ -5336,7 +5336,7 @@
           <a:p>
             <a:fld id="{91912CC2-A05A-4F65-AF8C-0020DE008670}" type="datetimeFigureOut">
               <a:rPr lang="en-IN" smtClean="0"/>
-              <a:t>04-05-2025</a:t>
+              <a:t>22-06-2025</a:t>
             </a:fld>
             <a:endParaRPr lang="en-IN"/>
           </a:p>
@@ -13322,7 +13322,7 @@
         </p:nvSpPr>
         <p:spPr>
           <a:xfrm>
-            <a:off x="913795" y="609601"/>
+            <a:off x="913795" y="617221"/>
             <a:ext cx="9169543" cy="396240"/>
           </a:xfrm>
         </p:spPr>

</xml_diff>